<commit_message>
updated architecture diagrams with mermaid
</commit_message>
<xml_diff>
--- a/company-chatbot/Product-pipeline-docs/0.bot-architecture.pptx
+++ b/company-chatbot/Product-pipeline-docs/0.bot-architecture.pptx
@@ -5,7 +5,7 @@
     <p:sldMasterId id="2147483648" r:id="rId1"/>
   </p:sldMasterIdLst>
   <p:sldIdLst>
-    <p:sldId id="256" r:id="rId2"/>
+    <p:sldId id="257" r:id="rId2"/>
   </p:sldIdLst>
   <p:sldSz cx="12192000" cy="6858000"/>
   <p:notesSz cx="6858000" cy="9144000"/>
@@ -104,6 +104,11 @@
       </a:defRPr>
     </a:lvl9pPr>
   </p:defaultTextStyle>
+  <p:extLst>
+    <p:ext uri="{EFAFB233-063F-42B5-8137-9DF3F51BA10A}">
+      <p15:sldGuideLst xmlns:p15="http://schemas.microsoft.com/office/powerpoint/2012/main"/>
+    </p:ext>
+  </p:extLst>
 </p:presentation>
 </file>
 
@@ -254,7 +259,7 @@
           <a:p>
             <a:fld id="{AE582450-8553-4B60-953D-D5C5CBFF30F4}" type="datetimeFigureOut">
               <a:rPr lang="en-US" smtClean="0"/>
-              <a:t>12/23/2024</a:t>
+              <a:t>1/3/2025</a:t>
             </a:fld>
             <a:endParaRPr lang="en-US"/>
           </a:p>
@@ -452,7 +457,7 @@
           <a:p>
             <a:fld id="{AE582450-8553-4B60-953D-D5C5CBFF30F4}" type="datetimeFigureOut">
               <a:rPr lang="en-US" smtClean="0"/>
-              <a:t>12/23/2024</a:t>
+              <a:t>1/3/2025</a:t>
             </a:fld>
             <a:endParaRPr lang="en-US"/>
           </a:p>
@@ -660,7 +665,7 @@
           <a:p>
             <a:fld id="{AE582450-8553-4B60-953D-D5C5CBFF30F4}" type="datetimeFigureOut">
               <a:rPr lang="en-US" smtClean="0"/>
-              <a:t>12/23/2024</a:t>
+              <a:t>1/3/2025</a:t>
             </a:fld>
             <a:endParaRPr lang="en-US"/>
           </a:p>
@@ -858,7 +863,7 @@
           <a:p>
             <a:fld id="{AE582450-8553-4B60-953D-D5C5CBFF30F4}" type="datetimeFigureOut">
               <a:rPr lang="en-US" smtClean="0"/>
-              <a:t>12/23/2024</a:t>
+              <a:t>1/3/2025</a:t>
             </a:fld>
             <a:endParaRPr lang="en-US"/>
           </a:p>
@@ -1133,7 +1138,7 @@
           <a:p>
             <a:fld id="{AE582450-8553-4B60-953D-D5C5CBFF30F4}" type="datetimeFigureOut">
               <a:rPr lang="en-US" smtClean="0"/>
-              <a:t>12/23/2024</a:t>
+              <a:t>1/3/2025</a:t>
             </a:fld>
             <a:endParaRPr lang="en-US"/>
           </a:p>
@@ -1398,7 +1403,7 @@
           <a:p>
             <a:fld id="{AE582450-8553-4B60-953D-D5C5CBFF30F4}" type="datetimeFigureOut">
               <a:rPr lang="en-US" smtClean="0"/>
-              <a:t>12/23/2024</a:t>
+              <a:t>1/3/2025</a:t>
             </a:fld>
             <a:endParaRPr lang="en-US"/>
           </a:p>
@@ -1810,7 +1815,7 @@
           <a:p>
             <a:fld id="{AE582450-8553-4B60-953D-D5C5CBFF30F4}" type="datetimeFigureOut">
               <a:rPr lang="en-US" smtClean="0"/>
-              <a:t>12/23/2024</a:t>
+              <a:t>1/3/2025</a:t>
             </a:fld>
             <a:endParaRPr lang="en-US"/>
           </a:p>
@@ -1951,7 +1956,7 @@
           <a:p>
             <a:fld id="{AE582450-8553-4B60-953D-D5C5CBFF30F4}" type="datetimeFigureOut">
               <a:rPr lang="en-US" smtClean="0"/>
-              <a:t>12/23/2024</a:t>
+              <a:t>1/3/2025</a:t>
             </a:fld>
             <a:endParaRPr lang="en-US"/>
           </a:p>
@@ -2064,7 +2069,7 @@
           <a:p>
             <a:fld id="{AE582450-8553-4B60-953D-D5C5CBFF30F4}" type="datetimeFigureOut">
               <a:rPr lang="en-US" smtClean="0"/>
-              <a:t>12/23/2024</a:t>
+              <a:t>1/3/2025</a:t>
             </a:fld>
             <a:endParaRPr lang="en-US"/>
           </a:p>
@@ -2375,7 +2380,7 @@
           <a:p>
             <a:fld id="{AE582450-8553-4B60-953D-D5C5CBFF30F4}" type="datetimeFigureOut">
               <a:rPr lang="en-US" smtClean="0"/>
-              <a:t>12/23/2024</a:t>
+              <a:t>1/3/2025</a:t>
             </a:fld>
             <a:endParaRPr lang="en-US"/>
           </a:p>
@@ -2663,7 +2668,7 @@
           <a:p>
             <a:fld id="{AE582450-8553-4B60-953D-D5C5CBFF30F4}" type="datetimeFigureOut">
               <a:rPr lang="en-US" smtClean="0"/>
-              <a:t>12/23/2024</a:t>
+              <a:t>1/3/2025</a:t>
             </a:fld>
             <a:endParaRPr lang="en-US"/>
           </a:p>
@@ -2904,7 +2909,7 @@
           <a:p>
             <a:fld id="{AE582450-8553-4B60-953D-D5C5CBFF30F4}" type="datetimeFigureOut">
               <a:rPr lang="en-US" smtClean="0"/>
-              <a:t>12/23/2024</a:t>
+              <a:t>1/3/2025</a:t>
             </a:fld>
             <a:endParaRPr lang="en-US"/>
           </a:p>
@@ -3326,55 +3331,76 @@
           <p:cNvPr id="2" name="Title 1">
             <a:extLst>
               <a:ext uri="{FF2B5EF4-FFF2-40B4-BE49-F238E27FC236}">
-                <a16:creationId xmlns:a16="http://schemas.microsoft.com/office/drawing/2014/main" id="{4E02A08C-B722-8827-6BF7-32E00B234641}"/>
-              </a:ext>
-            </a:extLst>
-          </p:cNvPr>
-          <p:cNvSpPr>
-            <a:spLocks noGrp="1"/>
-          </p:cNvSpPr>
-          <p:nvPr>
-            <p:ph type="ctrTitle"/>
-          </p:nvPr>
-        </p:nvSpPr>
-        <p:spPr/>
-        <p:txBody>
-          <a:bodyPr/>
-          <a:lstStyle/>
-          <a:p>
-            <a:endParaRPr lang="en-US"/>
-          </a:p>
-        </p:txBody>
-      </p:sp>
-      <p:sp>
-        <p:nvSpPr>
-          <p:cNvPr id="3" name="Subtitle 2">
-            <a:extLst>
-              <a:ext uri="{FF2B5EF4-FFF2-40B4-BE49-F238E27FC236}">
-                <a16:creationId xmlns:a16="http://schemas.microsoft.com/office/drawing/2014/main" id="{12F896E8-E01F-1542-3DE7-696A2AFA63E8}"/>
-              </a:ext>
-            </a:extLst>
-          </p:cNvPr>
-          <p:cNvSpPr>
-            <a:spLocks noGrp="1"/>
-          </p:cNvSpPr>
-          <p:nvPr>
-            <p:ph type="subTitle" idx="1"/>
-          </p:nvPr>
-        </p:nvSpPr>
-        <p:spPr/>
-        <p:txBody>
-          <a:bodyPr/>
-          <a:lstStyle/>
-          <a:p>
-            <a:endParaRPr lang="en-US"/>
-          </a:p>
-        </p:txBody>
-      </p:sp>
+                <a16:creationId xmlns:a16="http://schemas.microsoft.com/office/drawing/2014/main" id="{10C3D18A-8ABA-5605-5CB6-F4CE0FBEBAC4}"/>
+              </a:ext>
+            </a:extLst>
+          </p:cNvPr>
+          <p:cNvSpPr>
+            <a:spLocks noGrp="1"/>
+          </p:cNvSpPr>
+          <p:nvPr>
+            <p:ph type="title"/>
+          </p:nvPr>
+        </p:nvSpPr>
+        <p:spPr>
+          <a:xfrm>
+            <a:off x="838200" y="208371"/>
+            <a:ext cx="10515600" cy="549275"/>
+          </a:xfrm>
+        </p:spPr>
+        <p:txBody>
+          <a:bodyPr>
+            <a:normAutofit fontScale="90000"/>
+          </a:bodyPr>
+          <a:lstStyle/>
+          <a:p>
+            <a:r>
+              <a:rPr lang="en-GB" dirty="0"/>
+              <a:t>Bot architecture in Production</a:t>
+            </a:r>
+            <a:endParaRPr lang="en-US" dirty="0"/>
+          </a:p>
+        </p:txBody>
+      </p:sp>
+      <p:pic>
+        <p:nvPicPr>
+          <p:cNvPr id="5" name="Content Placeholder 4">
+            <a:extLst>
+              <a:ext uri="{FF2B5EF4-FFF2-40B4-BE49-F238E27FC236}">
+                <a16:creationId xmlns:a16="http://schemas.microsoft.com/office/drawing/2014/main" id="{0DD8EBEA-50A5-862B-4D94-5500141303D1}"/>
+              </a:ext>
+            </a:extLst>
+          </p:cNvPr>
+          <p:cNvPicPr>
+            <a:picLocks noGrp="1" noChangeAspect="1"/>
+          </p:cNvPicPr>
+          <p:nvPr>
+            <p:ph idx="1"/>
+          </p:nvPr>
+        </p:nvPicPr>
+        <p:blipFill>
+          <a:blip r:embed="rId2">
+            <a:extLst>
+              <a:ext uri="{28A0092B-C50C-407E-A947-70E740481C1C}">
+                <a14:useLocalDpi xmlns:a14="http://schemas.microsoft.com/office/drawing/2010/main" val="0"/>
+              </a:ext>
+            </a:extLst>
+          </a:blip>
+          <a:stretch>
+            <a:fillRect/>
+          </a:stretch>
+        </p:blipFill>
+        <p:spPr>
+          <a:xfrm>
+            <a:off x="2668781" y="872332"/>
+            <a:ext cx="7250282" cy="5520857"/>
+          </a:xfrm>
+        </p:spPr>
+      </p:pic>
     </p:spTree>
     <p:extLst>
       <p:ext uri="{BB962C8B-B14F-4D97-AF65-F5344CB8AC3E}">
-        <p14:creationId xmlns:p14="http://schemas.microsoft.com/office/powerpoint/2010/main" val="343808364"/>
+        <p14:creationId xmlns:p14="http://schemas.microsoft.com/office/powerpoint/2010/main" val="1571557244"/>
       </p:ext>
     </p:extLst>
   </p:cSld>

</xml_diff>